<commit_message>
Alterações no slide e no código de Procedure
</commit_message>
<xml_diff>
--- a/Slide.pptx
+++ b/Slide.pptx
@@ -310,7 +310,7 @@
           <a:p>
             <a:fld id="{F0E51C7C-CEA3-4CAA-BE4B-344879E7C377}" type="datetimeFigureOut">
               <a:rPr lang="de-DE" smtClean="0"/>
-              <a:t>05.02.2019</a:t>
+              <a:t>06.02.2019</a:t>
             </a:fld>
             <a:endParaRPr lang="de-DE"/>
           </a:p>
@@ -648,7 +648,7 @@
           <a:p>
             <a:fld id="{F0E51C7C-CEA3-4CAA-BE4B-344879E7C377}" type="datetimeFigureOut">
               <a:rPr lang="de-DE" smtClean="0"/>
-              <a:t>05.02.2019</a:t>
+              <a:t>06.02.2019</a:t>
             </a:fld>
             <a:endParaRPr lang="de-DE"/>
           </a:p>
@@ -1049,7 +1049,7 @@
           <a:p>
             <a:fld id="{F0E51C7C-CEA3-4CAA-BE4B-344879E7C377}" type="datetimeFigureOut">
               <a:rPr lang="de-DE" smtClean="0"/>
-              <a:t>05.02.2019</a:t>
+              <a:t>06.02.2019</a:t>
             </a:fld>
             <a:endParaRPr lang="de-DE"/>
           </a:p>
@@ -1385,7 +1385,7 @@
           <a:p>
             <a:fld id="{F0E51C7C-CEA3-4CAA-BE4B-344879E7C377}" type="datetimeFigureOut">
               <a:rPr lang="de-DE" smtClean="0"/>
-              <a:t>05.02.2019</a:t>
+              <a:t>06.02.2019</a:t>
             </a:fld>
             <a:endParaRPr lang="de-DE"/>
           </a:p>
@@ -1705,7 +1705,7 @@
           <a:p>
             <a:fld id="{F0E51C7C-CEA3-4CAA-BE4B-344879E7C377}" type="datetimeFigureOut">
               <a:rPr lang="de-DE" smtClean="0"/>
-              <a:t>05.02.2019</a:t>
+              <a:t>06.02.2019</a:t>
             </a:fld>
             <a:endParaRPr lang="de-DE"/>
           </a:p>
@@ -2101,7 +2101,7 @@
           <a:p>
             <a:fld id="{F0E51C7C-CEA3-4CAA-BE4B-344879E7C377}" type="datetimeFigureOut">
               <a:rPr lang="de-DE" smtClean="0"/>
-              <a:t>05.02.2019</a:t>
+              <a:t>06.02.2019</a:t>
             </a:fld>
             <a:endParaRPr lang="de-DE"/>
           </a:p>
@@ -2358,7 +2358,7 @@
           <a:p>
             <a:fld id="{F0E51C7C-CEA3-4CAA-BE4B-344879E7C377}" type="datetimeFigureOut">
               <a:rPr lang="de-DE" smtClean="0"/>
-              <a:t>05.02.2019</a:t>
+              <a:t>06.02.2019</a:t>
             </a:fld>
             <a:endParaRPr lang="de-DE"/>
           </a:p>
@@ -2620,7 +2620,7 @@
           <a:p>
             <a:fld id="{F0E51C7C-CEA3-4CAA-BE4B-344879E7C377}" type="datetimeFigureOut">
               <a:rPr lang="de-DE" smtClean="0"/>
-              <a:t>05.02.2019</a:t>
+              <a:t>06.02.2019</a:t>
             </a:fld>
             <a:endParaRPr lang="de-DE"/>
           </a:p>
@@ -2882,7 +2882,7 @@
           <a:p>
             <a:fld id="{F0E51C7C-CEA3-4CAA-BE4B-344879E7C377}" type="datetimeFigureOut">
               <a:rPr lang="de-DE" smtClean="0"/>
-              <a:t>05.02.2019</a:t>
+              <a:t>06.02.2019</a:t>
             </a:fld>
             <a:endParaRPr lang="de-DE"/>
           </a:p>
@@ -3211,7 +3211,7 @@
           <a:p>
             <a:fld id="{F0E51C7C-CEA3-4CAA-BE4B-344879E7C377}" type="datetimeFigureOut">
               <a:rPr lang="de-DE" smtClean="0"/>
-              <a:t>05.02.2019</a:t>
+              <a:t>06.02.2019</a:t>
             </a:fld>
             <a:endParaRPr lang="de-DE"/>
           </a:p>
@@ -3534,7 +3534,7 @@
           <a:p>
             <a:fld id="{F0E51C7C-CEA3-4CAA-BE4B-344879E7C377}" type="datetimeFigureOut">
               <a:rPr lang="de-DE" smtClean="0"/>
-              <a:t>05.02.2019</a:t>
+              <a:t>06.02.2019</a:t>
             </a:fld>
             <a:endParaRPr lang="de-DE"/>
           </a:p>
@@ -3991,7 +3991,7 @@
           <a:p>
             <a:fld id="{F0E51C7C-CEA3-4CAA-BE4B-344879E7C377}" type="datetimeFigureOut">
               <a:rPr lang="de-DE" smtClean="0"/>
-              <a:t>05.02.2019</a:t>
+              <a:t>06.02.2019</a:t>
             </a:fld>
             <a:endParaRPr lang="de-DE"/>
           </a:p>
@@ -4196,7 +4196,7 @@
           <a:p>
             <a:fld id="{F0E51C7C-CEA3-4CAA-BE4B-344879E7C377}" type="datetimeFigureOut">
               <a:rPr lang="de-DE" smtClean="0"/>
-              <a:t>05.02.2019</a:t>
+              <a:t>06.02.2019</a:t>
             </a:fld>
             <a:endParaRPr lang="de-DE"/>
           </a:p>
@@ -4373,7 +4373,7 @@
           <a:p>
             <a:fld id="{F0E51C7C-CEA3-4CAA-BE4B-344879E7C377}" type="datetimeFigureOut">
               <a:rPr lang="de-DE" smtClean="0"/>
-              <a:t>05.02.2019</a:t>
+              <a:t>06.02.2019</a:t>
             </a:fld>
             <a:endParaRPr lang="de-DE"/>
           </a:p>
@@ -4706,7 +4706,7 @@
           <a:p>
             <a:fld id="{F0E51C7C-CEA3-4CAA-BE4B-344879E7C377}" type="datetimeFigureOut">
               <a:rPr lang="de-DE" smtClean="0"/>
-              <a:t>05.02.2019</a:t>
+              <a:t>06.02.2019</a:t>
             </a:fld>
             <a:endParaRPr lang="de-DE"/>
           </a:p>
@@ -5051,7 +5051,7 @@
           <a:p>
             <a:fld id="{F0E51C7C-CEA3-4CAA-BE4B-344879E7C377}" type="datetimeFigureOut">
               <a:rPr lang="de-DE" smtClean="0"/>
-              <a:t>05.02.2019</a:t>
+              <a:t>06.02.2019</a:t>
             </a:fld>
             <a:endParaRPr lang="de-DE"/>
           </a:p>
@@ -7105,7 +7105,7 @@
           <a:p>
             <a:fld id="{F0E51C7C-CEA3-4CAA-BE4B-344879E7C377}" type="datetimeFigureOut">
               <a:rPr lang="de-DE" smtClean="0"/>
-              <a:t>05.02.2019</a:t>
+              <a:t>06.02.2019</a:t>
             </a:fld>
             <a:endParaRPr lang="de-DE"/>
           </a:p>
@@ -7639,7 +7639,7 @@
                 <a16:creationId xmlns:a16="http://schemas.microsoft.com/office/drawing/2014/main" id="{57ABABA7-0420-4200-9B65-1C1967CE9373}"/>
               </a:ext>
               <a:ext uri="{C183D7F6-B498-43B3-948B-1728B52AA6E4}">
-                <adec:decorative xmlns:adec="http://schemas.microsoft.com/office/drawing/2017/decorative" val="1"/>
+                <adec:decorative xmlns:adec="http://schemas.microsoft.com/office/drawing/2017/decorative" xmlns="" val="1"/>
               </a:ext>
             </a:extLst>
           </p:cNvPr>
@@ -7699,7 +7699,7 @@
                 <a16:creationId xmlns:a16="http://schemas.microsoft.com/office/drawing/2014/main" id="{A317EBE3-FF86-4DA1-BC9A-331F7F2144E9}"/>
               </a:ext>
               <a:ext uri="{C183D7F6-B498-43B3-948B-1728B52AA6E4}">
-                <adec:decorative xmlns:adec="http://schemas.microsoft.com/office/drawing/2017/decorative" val="1"/>
+                <adec:decorative xmlns:adec="http://schemas.microsoft.com/office/drawing/2017/decorative" xmlns="" val="1"/>
               </a:ext>
             </a:extLst>
           </p:cNvPr>
@@ -7753,7 +7753,7 @@
                 <a16:creationId xmlns:a16="http://schemas.microsoft.com/office/drawing/2014/main" id="{34D43EC1-35FA-4FC3-8526-F655CEB09D9C}"/>
               </a:ext>
               <a:ext uri="{C183D7F6-B498-43B3-948B-1728B52AA6E4}">
-                <adec:decorative xmlns:adec="http://schemas.microsoft.com/office/drawing/2017/decorative" val="1"/>
+                <adec:decorative xmlns:adec="http://schemas.microsoft.com/office/drawing/2017/decorative" xmlns="" val="1"/>
               </a:ext>
             </a:extLst>
           </p:cNvPr>
@@ -7805,7 +7805,7 @@
                 <a16:creationId xmlns:a16="http://schemas.microsoft.com/office/drawing/2014/main" id="{7A03E380-9CD1-4ABA-A763-9F9D252B8908}"/>
               </a:ext>
               <a:ext uri="{C183D7F6-B498-43B3-948B-1728B52AA6E4}">
-                <adec:decorative xmlns:adec="http://schemas.microsoft.com/office/drawing/2017/decorative" val="1"/>
+                <adec:decorative xmlns:adec="http://schemas.microsoft.com/office/drawing/2017/decorative" xmlns="" val="1"/>
               </a:ext>
             </a:extLst>
           </p:cNvPr>
@@ -7843,7 +7843,7 @@
                   <a16:creationId xmlns:a16="http://schemas.microsoft.com/office/drawing/2014/main" id="{66E01B84-4C2B-4DE5-90C8-9C4001A75B11}"/>
                 </a:ext>
                 <a:ext uri="{C183D7F6-B498-43B3-948B-1728B52AA6E4}">
-                  <adec:decorative xmlns:adec="http://schemas.microsoft.com/office/drawing/2017/decorative" val="1"/>
+                  <adec:decorative xmlns:adec="http://schemas.microsoft.com/office/drawing/2017/decorative" xmlns="" val="1"/>
                 </a:ext>
               </a:extLst>
             </p:cNvPr>
@@ -7915,7 +7915,7 @@
                   <a16:creationId xmlns:a16="http://schemas.microsoft.com/office/drawing/2014/main" id="{64CE5A7A-D5C5-4FE5-860C-0B5748FDEEDC}"/>
                 </a:ext>
                 <a:ext uri="{C183D7F6-B498-43B3-948B-1728B52AA6E4}">
-                  <adec:decorative xmlns:adec="http://schemas.microsoft.com/office/drawing/2017/decorative" val="1"/>
+                  <adec:decorative xmlns:adec="http://schemas.microsoft.com/office/drawing/2017/decorative" xmlns="" val="1"/>
                 </a:ext>
               </a:extLst>
             </p:cNvPr>
@@ -7992,7 +7992,7 @@
                   <a16:creationId xmlns:a16="http://schemas.microsoft.com/office/drawing/2014/main" id="{016A7D2A-6EEA-47B8-A763-7D82E41B3CED}"/>
                 </a:ext>
                 <a:ext uri="{C183D7F6-B498-43B3-948B-1728B52AA6E4}">
-                  <adec:decorative xmlns:adec="http://schemas.microsoft.com/office/drawing/2017/decorative" val="1"/>
+                  <adec:decorative xmlns:adec="http://schemas.microsoft.com/office/drawing/2017/decorative" xmlns="" val="1"/>
                 </a:ext>
               </a:extLst>
             </p:cNvPr>
@@ -8074,7 +8074,7 @@
                   <a16:creationId xmlns:a16="http://schemas.microsoft.com/office/drawing/2014/main" id="{E758F6E7-6DEC-48D0-ACB1-E5E26B13E6C3}"/>
                 </a:ext>
                 <a:ext uri="{C183D7F6-B498-43B3-948B-1728B52AA6E4}">
-                  <adec:decorative xmlns:adec="http://schemas.microsoft.com/office/drawing/2017/decorative" val="1"/>
+                  <adec:decorative xmlns:adec="http://schemas.microsoft.com/office/drawing/2017/decorative" xmlns="" val="1"/>
                 </a:ext>
               </a:extLst>
             </p:cNvPr>
@@ -8136,7 +8136,7 @@
                   <a16:creationId xmlns:a16="http://schemas.microsoft.com/office/drawing/2014/main" id="{B56657FF-C027-42E7-859B-902929B6FA1C}"/>
                 </a:ext>
                 <a:ext uri="{C183D7F6-B498-43B3-948B-1728B52AA6E4}">
-                  <adec:decorative xmlns:adec="http://schemas.microsoft.com/office/drawing/2017/decorative" val="1"/>
+                  <adec:decorative xmlns:adec="http://schemas.microsoft.com/office/drawing/2017/decorative" xmlns="" val="1"/>
                 </a:ext>
               </a:extLst>
             </p:cNvPr>
@@ -8233,7 +8233,7 @@
                   <a16:creationId xmlns:a16="http://schemas.microsoft.com/office/drawing/2014/main" id="{79047F2A-5978-46C6-B3A2-54AAC2136B15}"/>
                 </a:ext>
                 <a:ext uri="{C183D7F6-B498-43B3-948B-1728B52AA6E4}">
-                  <adec:decorative xmlns:adec="http://schemas.microsoft.com/office/drawing/2017/decorative" val="1"/>
+                  <adec:decorative xmlns:adec="http://schemas.microsoft.com/office/drawing/2017/decorative" xmlns="" val="1"/>
                 </a:ext>
               </a:extLst>
             </p:cNvPr>
@@ -8325,7 +8325,7 @@
                   <a16:creationId xmlns:a16="http://schemas.microsoft.com/office/drawing/2014/main" id="{F3BE8FD1-0A72-4640-AC7A-2E057273F87D}"/>
                 </a:ext>
                 <a:ext uri="{C183D7F6-B498-43B3-948B-1728B52AA6E4}">
-                  <adec:decorative xmlns:adec="http://schemas.microsoft.com/office/drawing/2017/decorative" val="1"/>
+                  <adec:decorative xmlns:adec="http://schemas.microsoft.com/office/drawing/2017/decorative" xmlns="" val="1"/>
                 </a:ext>
               </a:extLst>
             </p:cNvPr>
@@ -8397,7 +8397,7 @@
                   <a16:creationId xmlns:a16="http://schemas.microsoft.com/office/drawing/2014/main" id="{752FC782-A372-4D11-B20D-958955E5641F}"/>
                 </a:ext>
                 <a:ext uri="{C183D7F6-B498-43B3-948B-1728B52AA6E4}">
-                  <adec:decorative xmlns:adec="http://schemas.microsoft.com/office/drawing/2017/decorative" val="1"/>
+                  <adec:decorative xmlns:adec="http://schemas.microsoft.com/office/drawing/2017/decorative" xmlns="" val="1"/>
                 </a:ext>
               </a:extLst>
             </p:cNvPr>
@@ -8489,7 +8489,7 @@
                   <a16:creationId xmlns:a16="http://schemas.microsoft.com/office/drawing/2014/main" id="{AA00B2F1-BEE2-444A-8249-C8E3212CA1A8}"/>
                 </a:ext>
                 <a:ext uri="{C183D7F6-B498-43B3-948B-1728B52AA6E4}">
-                  <adec:decorative xmlns:adec="http://schemas.microsoft.com/office/drawing/2017/decorative" val="1"/>
+                  <adec:decorative xmlns:adec="http://schemas.microsoft.com/office/drawing/2017/decorative" xmlns="" val="1"/>
                 </a:ext>
               </a:extLst>
             </p:cNvPr>
@@ -8616,7 +8616,7 @@
                   <a16:creationId xmlns:a16="http://schemas.microsoft.com/office/drawing/2014/main" id="{E7F5747E-514B-4CF7-B6B0-DAD714909789}"/>
                 </a:ext>
                 <a:ext uri="{C183D7F6-B498-43B3-948B-1728B52AA6E4}">
-                  <adec:decorative xmlns:adec="http://schemas.microsoft.com/office/drawing/2017/decorative" val="1"/>
+                  <adec:decorative xmlns:adec="http://schemas.microsoft.com/office/drawing/2017/decorative" xmlns="" val="1"/>
                 </a:ext>
               </a:extLst>
             </p:cNvPr>
@@ -8678,7 +8678,7 @@
                   <a16:creationId xmlns:a16="http://schemas.microsoft.com/office/drawing/2014/main" id="{931614BB-1593-40ED-8113-2BD11870556B}"/>
                 </a:ext>
                 <a:ext uri="{C183D7F6-B498-43B3-948B-1728B52AA6E4}">
-                  <adec:decorative xmlns:adec="http://schemas.microsoft.com/office/drawing/2017/decorative" val="1"/>
+                  <adec:decorative xmlns:adec="http://schemas.microsoft.com/office/drawing/2017/decorative" xmlns="" val="1"/>
                 </a:ext>
               </a:extLst>
             </p:cNvPr>
@@ -8750,7 +8750,7 @@
                   <a16:creationId xmlns:a16="http://schemas.microsoft.com/office/drawing/2014/main" id="{2691871F-F15C-4E19-BC9C-78E5748D744E}"/>
                 </a:ext>
                 <a:ext uri="{C183D7F6-B498-43B3-948B-1728B52AA6E4}">
-                  <adec:decorative xmlns:adec="http://schemas.microsoft.com/office/drawing/2017/decorative" val="1"/>
+                  <adec:decorative xmlns:adec="http://schemas.microsoft.com/office/drawing/2017/decorative" xmlns="" val="1"/>
                 </a:ext>
               </a:extLst>
             </p:cNvPr>
@@ -8853,23 +8853,7 @@
                   <a:schemeClr val="tx1"/>
                 </a:solidFill>
               </a:rPr>
-              <a:t>Storage </a:t>
-            </a:r>
-            <a:r>
-              <a:rPr lang="de-DE" err="1">
-                <a:solidFill>
-                  <a:schemeClr val="tx1"/>
-                </a:solidFill>
-              </a:rPr>
-              <a:t>Procedure</a:t>
-            </a:r>
-            <a:r>
-              <a:rPr lang="de-DE">
-                <a:solidFill>
-                  <a:schemeClr val="tx1"/>
-                </a:solidFill>
-              </a:rPr>
-              <a:t> &amp;</a:t>
+              <a:t>Storage Procedure &amp;</a:t>
             </a:r>
             <a:br>
               <a:rPr lang="de-DE" dirty="0">
@@ -8879,16 +8863,50 @@
               </a:rPr>
             </a:br>
             <a:r>
-              <a:rPr lang="de-DE">
+              <a:rPr lang="de-DE" dirty="0" smtClean="0">
                 <a:solidFill>
                   <a:schemeClr val="tx1"/>
                 </a:solidFill>
               </a:rPr>
               <a:t>Trigger</a:t>
             </a:r>
+            <a:br>
+              <a:rPr lang="de-DE" dirty="0" smtClean="0">
+                <a:solidFill>
+                  <a:schemeClr val="tx1"/>
+                </a:solidFill>
+              </a:rPr>
+            </a:br>
+            <a:r>
+              <a:rPr lang="de-DE" dirty="0" smtClean="0">
+                <a:solidFill>
+                  <a:schemeClr val="tx1"/>
+                </a:solidFill>
+              </a:rPr>
+              <a:t/>
+            </a:r>
+            <a:br>
+              <a:rPr lang="de-DE" dirty="0" smtClean="0">
+                <a:solidFill>
+                  <a:schemeClr val="tx1"/>
+                </a:solidFill>
+              </a:rPr>
+            </a:br>
+            <a:r>
+              <a:rPr lang="de-DE" dirty="0" smtClean="0">
+                <a:solidFill>
+                  <a:schemeClr val="tx2">
+                    <a:lumMod val="50000"/>
+                  </a:schemeClr>
+                </a:solidFill>
+              </a:rPr>
+              <a:t>Astecas</a:t>
+            </a:r>
             <a:endParaRPr lang="de-DE" dirty="0">
               <a:solidFill>
-                <a:schemeClr val="tx1"/>
+                <a:schemeClr val="tx2">
+                  <a:lumMod val="50000"/>
+                </a:schemeClr>
               </a:solidFill>
             </a:endParaRPr>
           </a:p>
@@ -8984,6 +9002,13 @@
   <p:clrMapOvr>
     <a:masterClrMapping/>
   </p:clrMapOvr>
+  <p:timing>
+    <p:tnLst>
+      <p:par>
+        <p:cTn id="1" dur="indefinite" restart="never" nodeType="tmRoot"/>
+      </p:par>
+    </p:tnLst>
+  </p:timing>
 </p:sld>
 </file>
 
@@ -9033,6 +9058,10 @@
               <a:rPr lang="pt-BR" dirty="0"/>
               <a:t> Procedure</a:t>
             </a:r>
+            <a:r>
+              <a:rPr lang="en-US" dirty="0"/>
+              <a:t/>
+            </a:r>
             <a:br>
               <a:rPr lang="en-US" dirty="0"/>
             </a:br>
@@ -9064,7 +9093,11 @@
           <a:bodyPr/>
           <a:lstStyle/>
           <a:p>
-            <a:endParaRPr lang="pt-BR"/>
+            <a:r>
+              <a:rPr lang="pt-BR" dirty="0" smtClean="0"/>
+              <a:t>É possível encapsular funções no banco de dados?</a:t>
+            </a:r>
+            <a:endParaRPr lang="pt-BR" dirty="0"/>
           </a:p>
         </p:txBody>
       </p:sp>
@@ -9078,6 +9111,13 @@
   <p:clrMapOvr>
     <a:masterClrMapping/>
   </p:clrMapOvr>
+  <p:timing>
+    <p:tnLst>
+      <p:par>
+        <p:cTn id="1" dur="indefinite" restart="never" nodeType="tmRoot"/>
+      </p:par>
+    </p:tnLst>
+  </p:timing>
 </p:sld>
 </file>
 
@@ -9182,6 +9222,13 @@
   <p:clrMapOvr>
     <a:masterClrMapping/>
   </p:clrMapOvr>
+  <p:timing>
+    <p:tnLst>
+      <p:par>
+        <p:cTn id="1" dur="indefinite" restart="never" nodeType="tmRoot"/>
+      </p:par>
+    </p:tnLst>
+  </p:timing>
 </p:sld>
 </file>
 

</xml_diff>